<commit_message>
Added App.css and worked on Profile Page, working on apis for it now
</commit_message>
<xml_diff>
--- a/WireDiagram_21Dec.pptx
+++ b/WireDiagram_21Dec.pptx
@@ -5,7 +5,7 @@
     <p:sldMasterId id="2147483684" r:id="rId1"/>
   </p:sldMasterIdLst>
   <p:notesMasterIdLst>
-    <p:notesMasterId r:id="rId8"/>
+    <p:notesMasterId r:id="rId9"/>
   </p:notesMasterIdLst>
   <p:sldIdLst>
     <p:sldId id="256" r:id="rId2"/>
@@ -14,6 +14,7 @@
     <p:sldId id="262" r:id="rId5"/>
     <p:sldId id="261" r:id="rId6"/>
     <p:sldId id="265" r:id="rId7"/>
+    <p:sldId id="267" r:id="rId8"/>
   </p:sldIdLst>
   <p:sldSz cx="12192000" cy="6858000"/>
   <p:notesSz cx="6858000" cy="9144000"/>
@@ -202,7 +203,7 @@
           <a:p>
             <a:fld id="{5C6A2D9C-C68F-1F4E-AE34-8921984CC756}" type="datetimeFigureOut">
               <a:rPr lang="en-US" smtClean="0"/>
-              <a:t>12/20/20</a:t>
+              <a:t>12/21/2020</a:t>
             </a:fld>
             <a:endParaRPr lang="en-US"/>
           </a:p>
@@ -768,7 +769,7 @@
           <a:p>
             <a:fld id="{43BF7E63-4AD5-5044-AD9D-05E463883E5A}" type="datetimeFigureOut">
               <a:rPr lang="en-US" smtClean="0"/>
-              <a:t>12/20/20</a:t>
+              <a:t>12/21/2020</a:t>
             </a:fld>
             <a:endParaRPr lang="en-US"/>
           </a:p>
@@ -938,7 +939,7 @@
           <a:p>
             <a:fld id="{43BF7E63-4AD5-5044-AD9D-05E463883E5A}" type="datetimeFigureOut">
               <a:rPr lang="en-US" smtClean="0"/>
-              <a:t>12/20/20</a:t>
+              <a:t>12/21/2020</a:t>
             </a:fld>
             <a:endParaRPr lang="en-US"/>
           </a:p>
@@ -1118,7 +1119,7 @@
           <a:p>
             <a:fld id="{43BF7E63-4AD5-5044-AD9D-05E463883E5A}" type="datetimeFigureOut">
               <a:rPr lang="en-US" smtClean="0"/>
-              <a:t>12/20/20</a:t>
+              <a:t>12/21/2020</a:t>
             </a:fld>
             <a:endParaRPr lang="en-US"/>
           </a:p>
@@ -1288,7 +1289,7 @@
           <a:p>
             <a:fld id="{43BF7E63-4AD5-5044-AD9D-05E463883E5A}" type="datetimeFigureOut">
               <a:rPr lang="en-US" smtClean="0"/>
-              <a:t>12/20/20</a:t>
+              <a:t>12/21/2020</a:t>
             </a:fld>
             <a:endParaRPr lang="en-US"/>
           </a:p>
@@ -1534,7 +1535,7 @@
           <a:p>
             <a:fld id="{43BF7E63-4AD5-5044-AD9D-05E463883E5A}" type="datetimeFigureOut">
               <a:rPr lang="en-US" smtClean="0"/>
-              <a:t>12/20/20</a:t>
+              <a:t>12/21/2020</a:t>
             </a:fld>
             <a:endParaRPr lang="en-US"/>
           </a:p>
@@ -1766,7 +1767,7 @@
           <a:p>
             <a:fld id="{43BF7E63-4AD5-5044-AD9D-05E463883E5A}" type="datetimeFigureOut">
               <a:rPr lang="en-US" smtClean="0"/>
-              <a:t>12/20/20</a:t>
+              <a:t>12/21/2020</a:t>
             </a:fld>
             <a:endParaRPr lang="en-US"/>
           </a:p>
@@ -2133,7 +2134,7 @@
           <a:p>
             <a:fld id="{43BF7E63-4AD5-5044-AD9D-05E463883E5A}" type="datetimeFigureOut">
               <a:rPr lang="en-US" smtClean="0"/>
-              <a:t>12/20/20</a:t>
+              <a:t>12/21/2020</a:t>
             </a:fld>
             <a:endParaRPr lang="en-US"/>
           </a:p>
@@ -2251,7 +2252,7 @@
           <a:p>
             <a:fld id="{43BF7E63-4AD5-5044-AD9D-05E463883E5A}" type="datetimeFigureOut">
               <a:rPr lang="en-US" smtClean="0"/>
-              <a:t>12/20/20</a:t>
+              <a:t>12/21/2020</a:t>
             </a:fld>
             <a:endParaRPr lang="en-US"/>
           </a:p>
@@ -2346,7 +2347,7 @@
           <a:p>
             <a:fld id="{43BF7E63-4AD5-5044-AD9D-05E463883E5A}" type="datetimeFigureOut">
               <a:rPr lang="en-US" smtClean="0"/>
-              <a:t>12/20/20</a:t>
+              <a:t>12/21/2020</a:t>
             </a:fld>
             <a:endParaRPr lang="en-US"/>
           </a:p>
@@ -2623,7 +2624,7 @@
           <a:p>
             <a:fld id="{43BF7E63-4AD5-5044-AD9D-05E463883E5A}" type="datetimeFigureOut">
               <a:rPr lang="en-US" smtClean="0"/>
-              <a:t>12/20/20</a:t>
+              <a:t>12/21/2020</a:t>
             </a:fld>
             <a:endParaRPr lang="en-US"/>
           </a:p>
@@ -2880,7 +2881,7 @@
           <a:p>
             <a:fld id="{43BF7E63-4AD5-5044-AD9D-05E463883E5A}" type="datetimeFigureOut">
               <a:rPr lang="en-US" smtClean="0"/>
-              <a:t>12/20/20</a:t>
+              <a:t>12/21/2020</a:t>
             </a:fld>
             <a:endParaRPr lang="en-US"/>
           </a:p>
@@ -3093,7 +3094,7 @@
           <a:p>
             <a:fld id="{43BF7E63-4AD5-5044-AD9D-05E463883E5A}" type="datetimeFigureOut">
               <a:rPr lang="en-US" smtClean="0"/>
-              <a:t>12/20/20</a:t>
+              <a:t>12/21/2020</a:t>
             </a:fld>
             <a:endParaRPr lang="en-US"/>
           </a:p>
@@ -4909,102 +4910,410 @@
       </p:sp>
       <p:sp>
         <p:nvSpPr>
-          <p:cNvPr id="16" name="TextBox 15">
+          <p:cNvPr id="3" name="Rectangle: Rounded Corners 2">
             <a:extLst>
               <a:ext uri="{FF2B5EF4-FFF2-40B4-BE49-F238E27FC236}">
-                <a16:creationId xmlns:a16="http://schemas.microsoft.com/office/drawing/2014/main" id="{8CC1017D-5511-E64B-AC61-63F48CF96876}"/>
+                <a16:creationId xmlns:a16="http://schemas.microsoft.com/office/drawing/2014/main" id="{A0346582-AAA3-49AD-B2C3-9F3DFC3216C0}"/>
               </a:ext>
             </a:extLst>
           </p:cNvPr>
-          <p:cNvSpPr txBox="1"/>
+          <p:cNvSpPr/>
           <p:nvPr/>
         </p:nvSpPr>
         <p:spPr>
           <a:xfrm>
-            <a:off x="3984816" y="1393945"/>
-            <a:ext cx="3886200" cy="3046988"/>
+            <a:off x="2121657" y="989734"/>
+            <a:ext cx="1543050" cy="771525"/>
+          </a:xfrm>
+          <a:prstGeom prst="roundRect">
+            <a:avLst/>
+          </a:prstGeom>
+        </p:spPr>
+        <p:style>
+          <a:lnRef idx="2">
+            <a:schemeClr val="accent1">
+              <a:shade val="50000"/>
+            </a:schemeClr>
+          </a:lnRef>
+          <a:fillRef idx="1">
+            <a:schemeClr val="accent1"/>
+          </a:fillRef>
+          <a:effectRef idx="0">
+            <a:schemeClr val="accent1"/>
+          </a:effectRef>
+          <a:fontRef idx="minor">
+            <a:schemeClr val="lt1"/>
+          </a:fontRef>
+        </p:style>
+        <p:txBody>
+          <a:bodyPr rtlCol="0" anchor="ctr"/>
+          <a:lstStyle/>
+          <a:p>
+            <a:pPr algn="ctr"/>
+            <a:r>
+              <a:rPr lang="en-US" dirty="0"/>
+              <a:t>Email:</a:t>
+            </a:r>
+          </a:p>
+        </p:txBody>
+      </p:sp>
+      <p:sp>
+        <p:nvSpPr>
+          <p:cNvPr id="8" name="Rectangle: Rounded Corners 7">
+            <a:extLst>
+              <a:ext uri="{FF2B5EF4-FFF2-40B4-BE49-F238E27FC236}">
+                <a16:creationId xmlns:a16="http://schemas.microsoft.com/office/drawing/2014/main" id="{A5684846-F51B-44E6-85F1-EE5C2D0A9398}"/>
+              </a:ext>
+            </a:extLst>
+          </p:cNvPr>
+          <p:cNvSpPr/>
+          <p:nvPr/>
+        </p:nvSpPr>
+        <p:spPr>
+          <a:xfrm>
+            <a:off x="2121657" y="68651"/>
+            <a:ext cx="1543051" cy="771525"/>
+          </a:xfrm>
+          <a:prstGeom prst="roundRect">
+            <a:avLst/>
+          </a:prstGeom>
+        </p:spPr>
+        <p:style>
+          <a:lnRef idx="2">
+            <a:schemeClr val="accent1">
+              <a:shade val="50000"/>
+            </a:schemeClr>
+          </a:lnRef>
+          <a:fillRef idx="1">
+            <a:schemeClr val="accent1"/>
+          </a:fillRef>
+          <a:effectRef idx="0">
+            <a:schemeClr val="accent1"/>
+          </a:effectRef>
+          <a:fontRef idx="minor">
+            <a:schemeClr val="lt1"/>
+          </a:fontRef>
+        </p:style>
+        <p:txBody>
+          <a:bodyPr rtlCol="0" anchor="ctr"/>
+          <a:lstStyle/>
+          <a:p>
+            <a:pPr algn="ctr"/>
+            <a:r>
+              <a:rPr lang="en-US" dirty="0"/>
+              <a:t>First Name:</a:t>
+            </a:r>
+          </a:p>
+          <a:p>
+            <a:pPr algn="ctr"/>
+            <a:r>
+              <a:rPr lang="en-US" dirty="0"/>
+              <a:t>Last Name:</a:t>
+            </a:r>
+          </a:p>
+        </p:txBody>
+      </p:sp>
+      <p:sp>
+        <p:nvSpPr>
+          <p:cNvPr id="10" name="Rectangle: Rounded Corners 9">
+            <a:extLst>
+              <a:ext uri="{FF2B5EF4-FFF2-40B4-BE49-F238E27FC236}">
+                <a16:creationId xmlns:a16="http://schemas.microsoft.com/office/drawing/2014/main" id="{E1F8DA9A-FEDF-4B2F-B877-9D8976B53A7B}"/>
+              </a:ext>
+            </a:extLst>
+          </p:cNvPr>
+          <p:cNvSpPr/>
+          <p:nvPr/>
+        </p:nvSpPr>
+        <p:spPr>
+          <a:xfrm>
+            <a:off x="3817107" y="989734"/>
+            <a:ext cx="3390900" cy="771525"/>
+          </a:xfrm>
+          <a:prstGeom prst="roundRect">
+            <a:avLst/>
+          </a:prstGeom>
+        </p:spPr>
+        <p:style>
+          <a:lnRef idx="2">
+            <a:schemeClr val="accent1">
+              <a:shade val="50000"/>
+            </a:schemeClr>
+          </a:lnRef>
+          <a:fillRef idx="1">
+            <a:schemeClr val="accent1"/>
+          </a:fillRef>
+          <a:effectRef idx="0">
+            <a:schemeClr val="accent1"/>
+          </a:effectRef>
+          <a:fontRef idx="minor">
+            <a:schemeClr val="lt1"/>
+          </a:fontRef>
+        </p:style>
+        <p:txBody>
+          <a:bodyPr rtlCol="0" anchor="ctr"/>
+          <a:lstStyle/>
+          <a:p>
+            <a:pPr algn="ctr"/>
+            <a:r>
+              <a:rPr lang="en-US" dirty="0"/>
+              <a:t>Bobby.Jenkins@gmail.com</a:t>
+            </a:r>
+          </a:p>
+        </p:txBody>
+      </p:sp>
+      <p:sp>
+        <p:nvSpPr>
+          <p:cNvPr id="11" name="Rectangle: Rounded Corners 10">
+            <a:extLst>
+              <a:ext uri="{FF2B5EF4-FFF2-40B4-BE49-F238E27FC236}">
+                <a16:creationId xmlns:a16="http://schemas.microsoft.com/office/drawing/2014/main" id="{B9B269DD-5568-4DEF-AFD4-5FB6ED8C5634}"/>
+              </a:ext>
+            </a:extLst>
+          </p:cNvPr>
+          <p:cNvSpPr/>
+          <p:nvPr/>
+        </p:nvSpPr>
+        <p:spPr>
+          <a:xfrm>
+            <a:off x="3817108" y="68651"/>
+            <a:ext cx="3390900" cy="771525"/>
+          </a:xfrm>
+          <a:prstGeom prst="roundRect">
+            <a:avLst/>
+          </a:prstGeom>
+        </p:spPr>
+        <p:style>
+          <a:lnRef idx="2">
+            <a:schemeClr val="accent1">
+              <a:shade val="50000"/>
+            </a:schemeClr>
+          </a:lnRef>
+          <a:fillRef idx="1">
+            <a:schemeClr val="accent1"/>
+          </a:fillRef>
+          <a:effectRef idx="0">
+            <a:schemeClr val="accent1"/>
+          </a:effectRef>
+          <a:fontRef idx="minor">
+            <a:schemeClr val="lt1"/>
+          </a:fontRef>
+        </p:style>
+        <p:txBody>
+          <a:bodyPr rtlCol="0" anchor="ctr"/>
+          <a:lstStyle/>
+          <a:p>
+            <a:pPr algn="ctr"/>
+            <a:r>
+              <a:rPr lang="en-US" dirty="0"/>
+              <a:t>Bobby</a:t>
+            </a:r>
+          </a:p>
+          <a:p>
+            <a:pPr algn="ctr"/>
+            <a:r>
+              <a:rPr lang="en-US" dirty="0"/>
+              <a:t>Jenkins</a:t>
+            </a:r>
+          </a:p>
+        </p:txBody>
+      </p:sp>
+      <p:sp>
+        <p:nvSpPr>
+          <p:cNvPr id="5" name="Rectangle 4">
+            <a:extLst>
+              <a:ext uri="{FF2B5EF4-FFF2-40B4-BE49-F238E27FC236}">
+                <a16:creationId xmlns:a16="http://schemas.microsoft.com/office/drawing/2014/main" id="{3C27EAFB-6199-4556-A381-D74556583952}"/>
+              </a:ext>
+            </a:extLst>
+          </p:cNvPr>
+          <p:cNvSpPr/>
+          <p:nvPr/>
+        </p:nvSpPr>
+        <p:spPr>
+          <a:xfrm>
+            <a:off x="5938838" y="2100083"/>
+            <a:ext cx="1457325" cy="771525"/>
           </a:xfrm>
           <a:prstGeom prst="rect">
             <a:avLst/>
           </a:prstGeom>
-          <a:noFill/>
         </p:spPr>
-        <p:txBody>
-          <a:bodyPr wrap="square" rtlCol="0">
-            <a:spAutoFit/>
-          </a:bodyPr>
+        <p:style>
+          <a:lnRef idx="2">
+            <a:schemeClr val="accent1">
+              <a:shade val="50000"/>
+            </a:schemeClr>
+          </a:lnRef>
+          <a:fillRef idx="1">
+            <a:schemeClr val="accent1"/>
+          </a:fillRef>
+          <a:effectRef idx="0">
+            <a:schemeClr val="accent1"/>
+          </a:effectRef>
+          <a:fontRef idx="minor">
+            <a:schemeClr val="lt1"/>
+          </a:fontRef>
+        </p:style>
+        <p:txBody>
+          <a:bodyPr rtlCol="0" anchor="ctr"/>
           <a:lstStyle/>
           <a:p>
             <a:pPr algn="ctr"/>
             <a:r>
-              <a:rPr lang="en-US" sz="9600" dirty="0"/>
-              <a:t>Profile Details</a:t>
-            </a:r>
-            <a:endParaRPr lang="en-US" dirty="0"/>
-          </a:p>
-        </p:txBody>
-      </p:sp>
-      <p:sp>
-        <p:nvSpPr>
-          <p:cNvPr id="2" name="TextBox 1">
+              <a:rPr lang="en-US" dirty="0"/>
+              <a:t>Groups</a:t>
+            </a:r>
+          </a:p>
+        </p:txBody>
+      </p:sp>
+      <p:sp>
+        <p:nvSpPr>
+          <p:cNvPr id="12" name="Rectangle 11">
             <a:extLst>
               <a:ext uri="{FF2B5EF4-FFF2-40B4-BE49-F238E27FC236}">
-                <a16:creationId xmlns:a16="http://schemas.microsoft.com/office/drawing/2014/main" id="{BCD40387-C289-7B41-9428-2BF4E7863031}"/>
+                <a16:creationId xmlns:a16="http://schemas.microsoft.com/office/drawing/2014/main" id="{B55152DB-16BF-4306-B004-99A08BFF4EE7}"/>
               </a:ext>
             </a:extLst>
           </p:cNvPr>
-          <p:cNvSpPr txBox="1"/>
+          <p:cNvSpPr/>
           <p:nvPr/>
         </p:nvSpPr>
         <p:spPr>
           <a:xfrm>
-            <a:off x="4268440" y="16895"/>
-            <a:ext cx="3119215" cy="1200329"/>
+            <a:off x="2207383" y="2985907"/>
+            <a:ext cx="4464880" cy="3172006"/>
           </a:xfrm>
           <a:prstGeom prst="rect">
             <a:avLst/>
           </a:prstGeom>
-          <a:noFill/>
         </p:spPr>
-        <p:txBody>
-          <a:bodyPr wrap="square" rtlCol="0">
-            <a:spAutoFit/>
-          </a:bodyPr>
+        <p:style>
+          <a:lnRef idx="2">
+            <a:schemeClr val="accent1">
+              <a:shade val="50000"/>
+            </a:schemeClr>
+          </a:lnRef>
+          <a:fillRef idx="1">
+            <a:schemeClr val="accent1"/>
+          </a:fillRef>
+          <a:effectRef idx="0">
+            <a:schemeClr val="accent1"/>
+          </a:effectRef>
+          <a:fontRef idx="minor">
+            <a:schemeClr val="lt1"/>
+          </a:fontRef>
+        </p:style>
+        <p:txBody>
+          <a:bodyPr rtlCol="0" anchor="ctr"/>
           <a:lstStyle/>
           <a:p>
-            <a:r>
-              <a:rPr lang="en-US" sz="1200" dirty="0"/>
-              <a:t>First name </a:t>
-            </a:r>
-          </a:p>
-          <a:p>
-            <a:r>
-              <a:rPr lang="en-US" sz="1200" dirty="0"/>
-              <a:t>Last name</a:t>
-            </a:r>
-          </a:p>
-          <a:p>
-            <a:r>
-              <a:rPr lang="en-US" sz="1200" dirty="0"/>
-              <a:t>Email</a:t>
-            </a:r>
-          </a:p>
-          <a:p>
-            <a:r>
-              <a:rPr lang="en-US" sz="1200" dirty="0"/>
-              <a:t>Group names(list)</a:t>
-            </a:r>
-          </a:p>
-          <a:p>
-            <a:r>
-              <a:rPr lang="en-US" sz="1200" dirty="0"/>
-              <a:t>Groups that people are in</a:t>
-            </a:r>
-          </a:p>
-          <a:p>
-            <a:r>
-              <a:rPr lang="en-US" sz="1200" dirty="0"/>
-              <a:t>	Break out into list</a:t>
+            <a:pPr algn="ctr"/>
+            <a:r>
+              <a:rPr lang="en-US" dirty="0"/>
+              <a:t>Group Name: XXXX   Parent: XXXX</a:t>
+            </a:r>
+          </a:p>
+          <a:p>
+            <a:pPr algn="ctr"/>
+            <a:r>
+              <a:rPr lang="en-US" dirty="0"/>
+              <a:t>Group Name: XXXX   Parent: XXXX</a:t>
+            </a:r>
+          </a:p>
+          <a:p>
+            <a:pPr algn="ctr"/>
+            <a:r>
+              <a:rPr lang="en-US" dirty="0"/>
+              <a:t>Group Name: XXXX   Parent: XXXX</a:t>
+            </a:r>
+          </a:p>
+          <a:p>
+            <a:pPr algn="ctr"/>
+            <a:r>
+              <a:rPr lang="en-US" dirty="0"/>
+              <a:t>Group Name: XXXX   Parent: XXXX</a:t>
+            </a:r>
+          </a:p>
+          <a:p>
+            <a:pPr algn="ctr"/>
+            <a:r>
+              <a:rPr lang="en-US" dirty="0"/>
+              <a:t>Group Name: XXXX   Parent: XXXX</a:t>
+            </a:r>
+          </a:p>
+          <a:p>
+            <a:pPr algn="ctr"/>
+            <a:endParaRPr lang="en-US" dirty="0"/>
+          </a:p>
+        </p:txBody>
+      </p:sp>
+      <p:sp>
+        <p:nvSpPr>
+          <p:cNvPr id="13" name="Rectangle 12">
+            <a:extLst>
+              <a:ext uri="{FF2B5EF4-FFF2-40B4-BE49-F238E27FC236}">
+                <a16:creationId xmlns:a16="http://schemas.microsoft.com/office/drawing/2014/main" id="{D7E7743B-C88C-433C-9A9A-A26971C7F385}"/>
+              </a:ext>
+            </a:extLst>
+          </p:cNvPr>
+          <p:cNvSpPr/>
+          <p:nvPr/>
+        </p:nvSpPr>
+        <p:spPr>
+          <a:xfrm>
+            <a:off x="6824663" y="2985907"/>
+            <a:ext cx="4464880" cy="3172006"/>
+          </a:xfrm>
+          <a:prstGeom prst="rect">
+            <a:avLst/>
+          </a:prstGeom>
+        </p:spPr>
+        <p:style>
+          <a:lnRef idx="2">
+            <a:schemeClr val="accent1">
+              <a:shade val="50000"/>
+            </a:schemeClr>
+          </a:lnRef>
+          <a:fillRef idx="1">
+            <a:schemeClr val="accent1"/>
+          </a:fillRef>
+          <a:effectRef idx="0">
+            <a:schemeClr val="accent1"/>
+          </a:effectRef>
+          <a:fontRef idx="minor">
+            <a:schemeClr val="lt1"/>
+          </a:fontRef>
+        </p:style>
+        <p:txBody>
+          <a:bodyPr rtlCol="0" anchor="ctr"/>
+          <a:lstStyle/>
+          <a:p>
+            <a:pPr algn="ctr"/>
+            <a:r>
+              <a:rPr lang="en-US" dirty="0"/>
+              <a:t>Group Name: XXXX   Parent: XXXX</a:t>
+            </a:r>
+          </a:p>
+          <a:p>
+            <a:pPr algn="ctr"/>
+            <a:r>
+              <a:rPr lang="en-US" dirty="0"/>
+              <a:t>Group Name: XXXX   Parent: XXXX</a:t>
+            </a:r>
+          </a:p>
+          <a:p>
+            <a:pPr algn="ctr"/>
+            <a:r>
+              <a:rPr lang="en-US" dirty="0"/>
+              <a:t>Group Name: XXXX   Parent: XXXX</a:t>
+            </a:r>
+          </a:p>
+          <a:p>
+            <a:pPr algn="ctr"/>
+            <a:r>
+              <a:rPr lang="en-US" dirty="0"/>
+              <a:t>Group Name: XXXX   Parent: XXXX</a:t>
             </a:r>
           </a:p>
         </p:txBody>
@@ -8685,6 +8994,400 @@
     <p:extLst>
       <p:ext uri="{BB962C8B-B14F-4D97-AF65-F5344CB8AC3E}">
         <p14:creationId xmlns:p14="http://schemas.microsoft.com/office/powerpoint/2010/main" val="745197625"/>
+      </p:ext>
+    </p:extLst>
+  </p:cSld>
+  <p:clrMapOvr>
+    <a:masterClrMapping/>
+  </p:clrMapOvr>
+</p:sld>
+</file>
+
+<file path=ppt/slides/slide7.xml><?xml version="1.0" encoding="utf-8"?>
+<p:sld xmlns:a="http://schemas.openxmlformats.org/drawingml/2006/main" xmlns:r="http://schemas.openxmlformats.org/officeDocument/2006/relationships" xmlns:p="http://schemas.openxmlformats.org/presentationml/2006/main">
+  <p:cSld>
+    <p:spTree>
+      <p:nvGrpSpPr>
+        <p:cNvPr id="1" name=""/>
+        <p:cNvGrpSpPr/>
+        <p:nvPr/>
+      </p:nvGrpSpPr>
+      <p:grpSpPr>
+        <a:xfrm>
+          <a:off x="0" y="0"/>
+          <a:ext cx="0" cy="0"/>
+          <a:chOff x="0" y="0"/>
+          <a:chExt cx="0" cy="0"/>
+        </a:xfrm>
+      </p:grpSpPr>
+      <p:sp>
+        <p:nvSpPr>
+          <p:cNvPr id="4" name="Rectangle 3">
+            <a:extLst>
+              <a:ext uri="{FF2B5EF4-FFF2-40B4-BE49-F238E27FC236}">
+                <a16:creationId xmlns:a16="http://schemas.microsoft.com/office/drawing/2014/main" id="{1B3BAE54-8BA9-4622-8331-D29EBF205A96}"/>
+              </a:ext>
+            </a:extLst>
+          </p:cNvPr>
+          <p:cNvSpPr/>
+          <p:nvPr/>
+        </p:nvSpPr>
+        <p:spPr>
+          <a:xfrm>
+            <a:off x="6587412" y="2971800"/>
+            <a:ext cx="1474237" cy="914400"/>
+          </a:xfrm>
+          <a:prstGeom prst="rect">
+            <a:avLst/>
+          </a:prstGeom>
+        </p:spPr>
+        <p:style>
+          <a:lnRef idx="2">
+            <a:schemeClr val="accent1">
+              <a:shade val="50000"/>
+            </a:schemeClr>
+          </a:lnRef>
+          <a:fillRef idx="1">
+            <a:schemeClr val="accent1"/>
+          </a:fillRef>
+          <a:effectRef idx="0">
+            <a:schemeClr val="accent1"/>
+          </a:effectRef>
+          <a:fontRef idx="minor">
+            <a:schemeClr val="lt1"/>
+          </a:fontRef>
+        </p:style>
+        <p:txBody>
+          <a:bodyPr rtlCol="0" anchor="ctr"/>
+          <a:lstStyle/>
+          <a:p>
+            <a:pPr algn="ctr"/>
+            <a:r>
+              <a:rPr lang="en-US" dirty="0"/>
+              <a:t>Group 3</a:t>
+            </a:r>
+          </a:p>
+        </p:txBody>
+      </p:sp>
+      <p:sp>
+        <p:nvSpPr>
+          <p:cNvPr id="5" name="Rectangle 4">
+            <a:extLst>
+              <a:ext uri="{FF2B5EF4-FFF2-40B4-BE49-F238E27FC236}">
+                <a16:creationId xmlns:a16="http://schemas.microsoft.com/office/drawing/2014/main" id="{FDD22E2C-40DF-43D9-BEFA-F583118B6F41}"/>
+              </a:ext>
+            </a:extLst>
+          </p:cNvPr>
+          <p:cNvSpPr/>
+          <p:nvPr/>
+        </p:nvSpPr>
+        <p:spPr>
+          <a:xfrm>
+            <a:off x="4932783" y="1866122"/>
+            <a:ext cx="1474237" cy="914400"/>
+          </a:xfrm>
+          <a:prstGeom prst="rect">
+            <a:avLst/>
+          </a:prstGeom>
+        </p:spPr>
+        <p:style>
+          <a:lnRef idx="2">
+            <a:schemeClr val="accent1">
+              <a:shade val="50000"/>
+            </a:schemeClr>
+          </a:lnRef>
+          <a:fillRef idx="1">
+            <a:schemeClr val="accent1"/>
+          </a:fillRef>
+          <a:effectRef idx="0">
+            <a:schemeClr val="accent1"/>
+          </a:effectRef>
+          <a:fontRef idx="minor">
+            <a:schemeClr val="lt1"/>
+          </a:fontRef>
+        </p:style>
+        <p:txBody>
+          <a:bodyPr rtlCol="0" anchor="ctr"/>
+          <a:lstStyle/>
+          <a:p>
+            <a:pPr algn="ctr"/>
+            <a:r>
+              <a:rPr lang="en-US" dirty="0"/>
+              <a:t>Group 2</a:t>
+            </a:r>
+          </a:p>
+        </p:txBody>
+      </p:sp>
+      <p:sp>
+        <p:nvSpPr>
+          <p:cNvPr id="6" name="Rectangle 5">
+            <a:extLst>
+              <a:ext uri="{FF2B5EF4-FFF2-40B4-BE49-F238E27FC236}">
+                <a16:creationId xmlns:a16="http://schemas.microsoft.com/office/drawing/2014/main" id="{EF407C73-962F-40DD-9F79-5782B5A7A905}"/>
+              </a:ext>
+            </a:extLst>
+          </p:cNvPr>
+          <p:cNvSpPr/>
+          <p:nvPr/>
+        </p:nvSpPr>
+        <p:spPr>
+          <a:xfrm>
+            <a:off x="4932784" y="494522"/>
+            <a:ext cx="1474237" cy="914400"/>
+          </a:xfrm>
+          <a:prstGeom prst="rect">
+            <a:avLst/>
+          </a:prstGeom>
+        </p:spPr>
+        <p:style>
+          <a:lnRef idx="2">
+            <a:schemeClr val="accent1">
+              <a:shade val="50000"/>
+            </a:schemeClr>
+          </a:lnRef>
+          <a:fillRef idx="1">
+            <a:schemeClr val="accent1"/>
+          </a:fillRef>
+          <a:effectRef idx="0">
+            <a:schemeClr val="accent1"/>
+          </a:effectRef>
+          <a:fontRef idx="minor">
+            <a:schemeClr val="lt1"/>
+          </a:fontRef>
+        </p:style>
+        <p:txBody>
+          <a:bodyPr rtlCol="0" anchor="ctr"/>
+          <a:lstStyle/>
+          <a:p>
+            <a:pPr algn="ctr"/>
+            <a:r>
+              <a:rPr lang="en-US" dirty="0"/>
+              <a:t>Group 1</a:t>
+            </a:r>
+          </a:p>
+        </p:txBody>
+      </p:sp>
+      <p:sp>
+        <p:nvSpPr>
+          <p:cNvPr id="7" name="Rectangle 6">
+            <a:extLst>
+              <a:ext uri="{FF2B5EF4-FFF2-40B4-BE49-F238E27FC236}">
+                <a16:creationId xmlns:a16="http://schemas.microsoft.com/office/drawing/2014/main" id="{BD6E718A-0011-4EDC-AD29-52A0507750C9}"/>
+              </a:ext>
+            </a:extLst>
+          </p:cNvPr>
+          <p:cNvSpPr/>
+          <p:nvPr/>
+        </p:nvSpPr>
+        <p:spPr>
+          <a:xfrm>
+            <a:off x="5066522" y="4320073"/>
+            <a:ext cx="1474237" cy="914400"/>
+          </a:xfrm>
+          <a:prstGeom prst="rect">
+            <a:avLst/>
+          </a:prstGeom>
+        </p:spPr>
+        <p:style>
+          <a:lnRef idx="2">
+            <a:schemeClr val="accent1">
+              <a:shade val="50000"/>
+            </a:schemeClr>
+          </a:lnRef>
+          <a:fillRef idx="1">
+            <a:schemeClr val="accent1"/>
+          </a:fillRef>
+          <a:effectRef idx="0">
+            <a:schemeClr val="accent1"/>
+          </a:effectRef>
+          <a:fontRef idx="minor">
+            <a:schemeClr val="lt1"/>
+          </a:fontRef>
+        </p:style>
+        <p:txBody>
+          <a:bodyPr rtlCol="0" anchor="ctr"/>
+          <a:lstStyle/>
+          <a:p>
+            <a:pPr algn="ctr"/>
+            <a:r>
+              <a:rPr lang="en-US" dirty="0"/>
+              <a:t>Group 4</a:t>
+            </a:r>
+          </a:p>
+        </p:txBody>
+      </p:sp>
+      <p:cxnSp>
+        <p:nvCxnSpPr>
+          <p:cNvPr id="9" name="Straight Arrow Connector 8">
+            <a:extLst>
+              <a:ext uri="{FF2B5EF4-FFF2-40B4-BE49-F238E27FC236}">
+                <a16:creationId xmlns:a16="http://schemas.microsoft.com/office/drawing/2014/main" id="{296D94C8-8A94-4E1B-B231-B1CE14FD6355}"/>
+              </a:ext>
+            </a:extLst>
+          </p:cNvPr>
+          <p:cNvCxnSpPr>
+            <a:stCxn id="6" idx="2"/>
+            <a:endCxn id="5" idx="0"/>
+          </p:cNvCxnSpPr>
+          <p:nvPr/>
+        </p:nvCxnSpPr>
+        <p:spPr>
+          <a:xfrm flipH="1">
+            <a:off x="5669902" y="1408922"/>
+            <a:ext cx="1" cy="457200"/>
+          </a:xfrm>
+          <a:prstGeom prst="straightConnector1">
+            <a:avLst/>
+          </a:prstGeom>
+          <a:ln>
+            <a:tailEnd type="triangle"/>
+          </a:ln>
+        </p:spPr>
+        <p:style>
+          <a:lnRef idx="1">
+            <a:schemeClr val="accent1"/>
+          </a:lnRef>
+          <a:fillRef idx="0">
+            <a:schemeClr val="accent1"/>
+          </a:fillRef>
+          <a:effectRef idx="0">
+            <a:schemeClr val="accent1"/>
+          </a:effectRef>
+          <a:fontRef idx="minor">
+            <a:schemeClr val="tx1"/>
+          </a:fontRef>
+        </p:style>
+      </p:cxnSp>
+      <p:cxnSp>
+        <p:nvCxnSpPr>
+          <p:cNvPr id="11" name="Straight Arrow Connector 10">
+            <a:extLst>
+              <a:ext uri="{FF2B5EF4-FFF2-40B4-BE49-F238E27FC236}">
+                <a16:creationId xmlns:a16="http://schemas.microsoft.com/office/drawing/2014/main" id="{BFF24061-8441-4ECB-B081-208A19C63CBB}"/>
+              </a:ext>
+            </a:extLst>
+          </p:cNvPr>
+          <p:cNvCxnSpPr>
+            <a:stCxn id="5" idx="3"/>
+            <a:endCxn id="4" idx="0"/>
+          </p:cNvCxnSpPr>
+          <p:nvPr/>
+        </p:nvCxnSpPr>
+        <p:spPr>
+          <a:xfrm>
+            <a:off x="6407020" y="2323322"/>
+            <a:ext cx="917511" cy="648478"/>
+          </a:xfrm>
+          <a:prstGeom prst="straightConnector1">
+            <a:avLst/>
+          </a:prstGeom>
+          <a:ln>
+            <a:tailEnd type="triangle"/>
+          </a:ln>
+        </p:spPr>
+        <p:style>
+          <a:lnRef idx="1">
+            <a:schemeClr val="accent1"/>
+          </a:lnRef>
+          <a:fillRef idx="0">
+            <a:schemeClr val="accent1"/>
+          </a:fillRef>
+          <a:effectRef idx="0">
+            <a:schemeClr val="accent1"/>
+          </a:effectRef>
+          <a:fontRef idx="minor">
+            <a:schemeClr val="tx1"/>
+          </a:fontRef>
+        </p:style>
+      </p:cxnSp>
+      <p:cxnSp>
+        <p:nvCxnSpPr>
+          <p:cNvPr id="13" name="Straight Arrow Connector 12">
+            <a:extLst>
+              <a:ext uri="{FF2B5EF4-FFF2-40B4-BE49-F238E27FC236}">
+                <a16:creationId xmlns:a16="http://schemas.microsoft.com/office/drawing/2014/main" id="{E938FDDE-0D22-4317-8309-97D784945915}"/>
+              </a:ext>
+            </a:extLst>
+          </p:cNvPr>
+          <p:cNvCxnSpPr>
+            <a:stCxn id="5" idx="2"/>
+            <a:endCxn id="7" idx="0"/>
+          </p:cNvCxnSpPr>
+          <p:nvPr/>
+        </p:nvCxnSpPr>
+        <p:spPr>
+          <a:xfrm>
+            <a:off x="5669902" y="2780522"/>
+            <a:ext cx="133739" cy="1539551"/>
+          </a:xfrm>
+          <a:prstGeom prst="straightConnector1">
+            <a:avLst/>
+          </a:prstGeom>
+          <a:ln>
+            <a:tailEnd type="triangle"/>
+          </a:ln>
+        </p:spPr>
+        <p:style>
+          <a:lnRef idx="1">
+            <a:schemeClr val="accent1"/>
+          </a:lnRef>
+          <a:fillRef idx="0">
+            <a:schemeClr val="accent1"/>
+          </a:fillRef>
+          <a:effectRef idx="0">
+            <a:schemeClr val="accent1"/>
+          </a:effectRef>
+          <a:fontRef idx="minor">
+            <a:schemeClr val="tx1"/>
+          </a:fontRef>
+        </p:style>
+      </p:cxnSp>
+      <p:cxnSp>
+        <p:nvCxnSpPr>
+          <p:cNvPr id="15" name="Straight Arrow Connector 14">
+            <a:extLst>
+              <a:ext uri="{FF2B5EF4-FFF2-40B4-BE49-F238E27FC236}">
+                <a16:creationId xmlns:a16="http://schemas.microsoft.com/office/drawing/2014/main" id="{3717F88C-BA8B-40B6-A4F4-5EE0EF49D4A1}"/>
+              </a:ext>
+            </a:extLst>
+          </p:cNvPr>
+          <p:cNvCxnSpPr>
+            <a:stCxn id="4" idx="2"/>
+            <a:endCxn id="7" idx="3"/>
+          </p:cNvCxnSpPr>
+          <p:nvPr/>
+        </p:nvCxnSpPr>
+        <p:spPr>
+          <a:xfrm flipH="1">
+            <a:off x="6540759" y="3886200"/>
+            <a:ext cx="783772" cy="891073"/>
+          </a:xfrm>
+          <a:prstGeom prst="straightConnector1">
+            <a:avLst/>
+          </a:prstGeom>
+          <a:ln>
+            <a:tailEnd type="triangle"/>
+          </a:ln>
+        </p:spPr>
+        <p:style>
+          <a:lnRef idx="1">
+            <a:schemeClr val="accent1"/>
+          </a:lnRef>
+          <a:fillRef idx="0">
+            <a:schemeClr val="accent1"/>
+          </a:fillRef>
+          <a:effectRef idx="0">
+            <a:schemeClr val="accent1"/>
+          </a:effectRef>
+          <a:fontRef idx="minor">
+            <a:schemeClr val="tx1"/>
+          </a:fontRef>
+        </p:style>
+      </p:cxnSp>
+    </p:spTree>
+    <p:extLst>
+      <p:ext uri="{BB962C8B-B14F-4D97-AF65-F5344CB8AC3E}">
+        <p14:creationId xmlns:p14="http://schemas.microsoft.com/office/powerpoint/2010/main" val="800910235"/>
       </p:ext>
     </p:extLst>
   </p:cSld>

</xml_diff>